<commit_message>
Updated PPT Slide to have download link instead of having full Eclipse IDE
</commit_message>
<xml_diff>
--- a/Workshop_Slides/Electronics Workshop (9).pptx
+++ b/Workshop_Slides/Electronics Workshop (9).pptx
@@ -321,7 +321,7 @@
           <a:p>
             <a:fld id="{C74EA88A-E894-402A-B01C-415A79A4A3F0}" type="datetimeFigureOut">
               <a:rPr lang="en-US" smtClean="0"/>
-              <a:t>7/8/2017</a:t>
+              <a:t>7/9/2017</a:t>
             </a:fld>
             <a:endParaRPr lang="en-US"/>
           </a:p>
@@ -515,7 +515,7 @@
           <a:p>
             <a:fld id="{C74EA88A-E894-402A-B01C-415A79A4A3F0}" type="datetimeFigureOut">
               <a:rPr lang="en-US" smtClean="0"/>
-              <a:t>7/8/2017</a:t>
+              <a:t>7/9/2017</a:t>
             </a:fld>
             <a:endParaRPr lang="en-US"/>
           </a:p>
@@ -703,7 +703,7 @@
           <a:p>
             <a:fld id="{C74EA88A-E894-402A-B01C-415A79A4A3F0}" type="datetimeFigureOut">
               <a:rPr lang="en-US" smtClean="0"/>
-              <a:t>7/8/2017</a:t>
+              <a:t>7/9/2017</a:t>
             </a:fld>
             <a:endParaRPr lang="en-US"/>
           </a:p>
@@ -932,7 +932,7 @@
           <a:p>
             <a:fld id="{C74EA88A-E894-402A-B01C-415A79A4A3F0}" type="datetimeFigureOut">
               <a:rPr lang="en-US" smtClean="0"/>
-              <a:t>7/8/2017</a:t>
+              <a:t>7/9/2017</a:t>
             </a:fld>
             <a:endParaRPr lang="en-US"/>
           </a:p>
@@ -1213,7 +1213,7 @@
           <a:p>
             <a:fld id="{C74EA88A-E894-402A-B01C-415A79A4A3F0}" type="datetimeFigureOut">
               <a:rPr lang="en-US" smtClean="0"/>
-              <a:t>7/8/2017</a:t>
+              <a:t>7/9/2017</a:t>
             </a:fld>
             <a:endParaRPr lang="en-US"/>
           </a:p>
@@ -1501,7 +1501,7 @@
           <a:p>
             <a:fld id="{C74EA88A-E894-402A-B01C-415A79A4A3F0}" type="datetimeFigureOut">
               <a:rPr lang="en-US" smtClean="0"/>
-              <a:t>7/8/2017</a:t>
+              <a:t>7/9/2017</a:t>
             </a:fld>
             <a:endParaRPr lang="en-US"/>
           </a:p>
@@ -2055,7 +2055,7 @@
           <a:p>
             <a:fld id="{C74EA88A-E894-402A-B01C-415A79A4A3F0}" type="datetimeFigureOut">
               <a:rPr lang="en-US" smtClean="0"/>
-              <a:t>7/8/2017</a:t>
+              <a:t>7/9/2017</a:t>
             </a:fld>
             <a:endParaRPr lang="en-US"/>
           </a:p>
@@ -2186,7 +2186,7 @@
           <a:p>
             <a:fld id="{C74EA88A-E894-402A-B01C-415A79A4A3F0}" type="datetimeFigureOut">
               <a:rPr lang="en-US" smtClean="0"/>
-              <a:t>7/8/2017</a:t>
+              <a:t>7/9/2017</a:t>
             </a:fld>
             <a:endParaRPr lang="en-US"/>
           </a:p>
@@ -2336,7 +2336,7 @@
           <a:p>
             <a:fld id="{C74EA88A-E894-402A-B01C-415A79A4A3F0}" type="datetimeFigureOut">
               <a:rPr lang="en-US" smtClean="0"/>
-              <a:t>7/8/2017</a:t>
+              <a:t>7/9/2017</a:t>
             </a:fld>
             <a:endParaRPr lang="en-US"/>
           </a:p>
@@ -2657,7 +2657,7 @@
           <a:p>
             <a:fld id="{C74EA88A-E894-402A-B01C-415A79A4A3F0}" type="datetimeFigureOut">
               <a:rPr lang="en-US" smtClean="0"/>
-              <a:t>7/8/2017</a:t>
+              <a:t>7/9/2017</a:t>
             </a:fld>
             <a:endParaRPr lang="en-US"/>
           </a:p>
@@ -2954,7 +2954,7 @@
           <a:p>
             <a:fld id="{C74EA88A-E894-402A-B01C-415A79A4A3F0}" type="datetimeFigureOut">
               <a:rPr lang="en-US" smtClean="0"/>
-              <a:t>7/8/2017</a:t>
+              <a:t>7/9/2017</a:t>
             </a:fld>
             <a:endParaRPr lang="en-US"/>
           </a:p>
@@ -3199,7 +3199,7 @@
           <a:p>
             <a:fld id="{C74EA88A-E894-402A-B01C-415A79A4A3F0}" type="datetimeFigureOut">
               <a:rPr lang="en-US" smtClean="0"/>
-              <a:t>7/8/2017</a:t>
+              <a:t>7/9/2017</a:t>
             </a:fld>
             <a:endParaRPr lang="en-US"/>
           </a:p>
@@ -4112,12 +4112,46 @@
           </a:xfrm>
         </p:spPr>
         <p:txBody>
-          <a:bodyPr/>
+          <a:bodyPr>
+            <a:normAutofit fontScale="92500" lnSpcReduction="20000"/>
+          </a:bodyPr>
           <a:lstStyle/>
           <a:p>
             <a:r>
               <a:rPr lang="en-US" dirty="0" smtClean="0"/>
-              <a:t>Simply launch ‘eclipse.exe’ to launch Eclipse IDE</a:t>
+              <a:t>Download Latest Version of Eclipse C/CPP IDE Here</a:t>
+            </a:r>
+          </a:p>
+          <a:p>
+            <a:pPr lvl="1"/>
+            <a:r>
+              <a:rPr lang="en-US">
+                <a:hlinkClick r:id="rId2"/>
+              </a:rPr>
+              <a:t>https</a:t>
+            </a:r>
+            <a:r>
+              <a:rPr lang="en-US">
+                <a:hlinkClick r:id="rId2"/>
+              </a:rPr>
+              <a:t>://</a:t>
+            </a:r>
+            <a:r>
+              <a:rPr lang="en-US" smtClean="0">
+                <a:hlinkClick r:id="rId2"/>
+              </a:rPr>
+              <a:t>eclipse.org/downloads/packages/eclipse-ide-cc-developers/keplersr2</a:t>
+            </a:r>
+            <a:endParaRPr lang="en-US" dirty="0" smtClean="0"/>
+          </a:p>
+          <a:p>
+            <a:r>
+              <a:rPr lang="en-US" dirty="0" smtClean="0"/>
+              <a:t>Simply </a:t>
+            </a:r>
+            <a:r>
+              <a:rPr lang="en-US" dirty="0" smtClean="0"/>
+              <a:t>launch ‘eclipse.exe’ to launch Eclipse IDE</a:t>
             </a:r>
           </a:p>
           <a:p>

</xml_diff>